<commit_message>
Update Report and Paper
</commit_message>
<xml_diff>
--- a/publications/Proj Inf_EI_Poster_A3.pptx
+++ b/publications/Proj Inf_EI_Poster_A3.pptx
@@ -5438,8 +5438,8 @@
         </p:nvCxnSpPr>
         <p:spPr bwMode="auto">
           <a:xfrm>
-            <a:off x="4671381" y="1676363"/>
-            <a:ext cx="0" cy="7200801"/>
+            <a:off x="4614244" y="1915301"/>
+            <a:ext cx="0" cy="6922250"/>
           </a:xfrm>
           <a:prstGeom prst="line">
             <a:avLst/>
@@ -5726,52 +5726,6 @@
           </a:p>
         </p:txBody>
       </p:sp>
-      <p:cxnSp>
-        <p:nvCxnSpPr>
-          <p:cNvPr id="13" name="Straight Connector 12">
-            <a:extLst>
-              <a:ext uri="{FF2B5EF4-FFF2-40B4-BE49-F238E27FC236}">
-                <a16:creationId xmlns:a16="http://schemas.microsoft.com/office/drawing/2014/main" id="{8D85D0C6-B3BF-AB31-6301-8F90F3E69586}"/>
-              </a:ext>
-            </a:extLst>
-          </p:cNvPr>
-          <p:cNvCxnSpPr/>
-          <p:nvPr/>
-        </p:nvCxnSpPr>
-        <p:spPr bwMode="auto">
-          <a:xfrm>
-            <a:off x="8844348" y="1676363"/>
-            <a:ext cx="0" cy="7200801"/>
-          </a:xfrm>
-          <a:prstGeom prst="line">
-            <a:avLst/>
-          </a:prstGeom>
-          <a:solidFill>
-            <a:schemeClr val="accent1"/>
-          </a:solidFill>
-          <a:ln w="9525" cap="flat" cmpd="sng" algn="ctr">
-            <a:solidFill>
-              <a:schemeClr val="tx1"/>
-            </a:solidFill>
-            <a:prstDash val="solid"/>
-            <a:round/>
-            <a:headEnd type="none" w="med" len="med"/>
-            <a:tailEnd type="none" w="med" len="med"/>
-          </a:ln>
-          <a:effectLst/>
-          <a:extLst>
-            <a:ext uri="{AF507438-7753-43E0-B8FC-AC1667EBCBE1}">
-              <a14:hiddenEffects xmlns:a14="http://schemas.microsoft.com/office/drawing/2010/main">
-                <a:effectLst>
-                  <a:outerShdw dist="35921" dir="2700000" algn="ctr" rotWithShape="0">
-                    <a:schemeClr val="bg2"/>
-                  </a:outerShdw>
-                </a:effectLst>
-              </a14:hiddenEffects>
-            </a:ext>
-          </a:extLst>
-        </p:spPr>
-      </p:cxnSp>
       <p:sp>
         <p:nvSpPr>
           <p:cNvPr id="15" name="Marcador de Posição de Conteúdo 2">
@@ -6657,7 +6611,7 @@
             </a:r>
             <a:r>
               <a:rPr lang="pt-PT" sz="1200" dirty="0"/>
-              <a:t>”. Preparamos este artigo com o intuito de fornecer uma visão abrangente da nossa abordagem ao problema, destacando a preparação dos dados e a criação e treino dos modelos. </a:t>
+              <a:t>”. Preparamos este artigo com o intuito de fornecer uma visão abrangente da nossa abordagem ao problema, destacando a preparação dos dados e a criação e treino de um dos modelos da Primeira Abordagem. </a:t>
             </a:r>
           </a:p>
           <a:p>
@@ -6672,6 +6626,233 @@
           </a:p>
         </p:txBody>
       </p:sp>
+      <p:sp>
+        <p:nvSpPr>
+          <p:cNvPr id="19" name="TextBox 18">
+            <a:extLst>
+              <a:ext uri="{FF2B5EF4-FFF2-40B4-BE49-F238E27FC236}">
+                <a16:creationId xmlns:a16="http://schemas.microsoft.com/office/drawing/2014/main" id="{347C8513-2C1A-F44B-7662-C600064AEE2A}"/>
+              </a:ext>
+            </a:extLst>
+          </p:cNvPr>
+          <p:cNvSpPr txBox="1"/>
+          <p:nvPr/>
+        </p:nvSpPr>
+        <p:spPr>
+          <a:xfrm>
+            <a:off x="9202984" y="3747683"/>
+            <a:ext cx="3190790" cy="646331"/>
+          </a:xfrm>
+          <a:prstGeom prst="rect">
+            <a:avLst/>
+          </a:prstGeom>
+          <a:noFill/>
+        </p:spPr>
+        <p:txBody>
+          <a:bodyPr wrap="square">
+            <a:spAutoFit/>
+          </a:bodyPr>
+          <a:lstStyle/>
+          <a:p>
+            <a:pPr marL="0" indent="0">
+              <a:buClr>
+                <a:srgbClr val="D45500"/>
+              </a:buClr>
+              <a:buFontTx/>
+              <a:buNone/>
+            </a:pPr>
+            <a:r>
+              <a:rPr lang="pt-PT" sz="1400" b="1" dirty="0"/>
+              <a:t>Primeira Abordagem: </a:t>
+            </a:r>
+          </a:p>
+          <a:p>
+            <a:pPr marL="285750" indent="-285750">
+              <a:buClr>
+                <a:srgbClr val="D45500"/>
+              </a:buClr>
+              <a:buFont typeface="Arial" panose="020B0604020202020204" pitchFamily="34" charset="0"/>
+              <a:buChar char="•"/>
+            </a:pPr>
+            <a:r>
+              <a:rPr lang="pt-PT" sz="1200" b="1" dirty="0" err="1">
+                <a:solidFill>
+                  <a:schemeClr val="tx1">
+                    <a:lumMod val="95000"/>
+                    <a:lumOff val="5000"/>
+                  </a:schemeClr>
+                </a:solidFill>
+              </a:rPr>
+              <a:t>Accuracy</a:t>
+            </a:r>
+            <a:r>
+              <a:rPr lang="pt-PT" sz="1200" b="1" dirty="0">
+                <a:solidFill>
+                  <a:schemeClr val="tx1">
+                    <a:lumMod val="95000"/>
+                    <a:lumOff val="5000"/>
+                  </a:schemeClr>
+                </a:solidFill>
+              </a:rPr>
+              <a:t> </a:t>
+            </a:r>
+            <a:r>
+              <a:rPr lang="pt-PT" sz="1200" b="1" dirty="0" err="1">
+                <a:solidFill>
+                  <a:schemeClr val="tx1">
+                    <a:lumMod val="95000"/>
+                    <a:lumOff val="5000"/>
+                  </a:schemeClr>
+                </a:solidFill>
+              </a:rPr>
+              <a:t>ConvLSTM</a:t>
+            </a:r>
+            <a:r>
+              <a:rPr lang="pt-PT" sz="1200" dirty="0">
+                <a:solidFill>
+                  <a:schemeClr val="tx1">
+                    <a:lumMod val="95000"/>
+                    <a:lumOff val="5000"/>
+                  </a:schemeClr>
+                </a:solidFill>
+              </a:rPr>
+              <a:t>: 97.71%</a:t>
+            </a:r>
+          </a:p>
+          <a:p>
+            <a:pPr marL="0" indent="0">
+              <a:buClr>
+                <a:srgbClr val="D45500"/>
+              </a:buClr>
+              <a:buFontTx/>
+              <a:buNone/>
+            </a:pPr>
+            <a:endParaRPr lang="pt-PT" sz="1000" dirty="0"/>
+          </a:p>
+        </p:txBody>
+      </p:sp>
+      <p:sp>
+        <p:nvSpPr>
+          <p:cNvPr id="20" name="TextBox 19">
+            <a:extLst>
+              <a:ext uri="{FF2B5EF4-FFF2-40B4-BE49-F238E27FC236}">
+                <a16:creationId xmlns:a16="http://schemas.microsoft.com/office/drawing/2014/main" id="{584E2C5E-0EB6-776C-B790-077A07B96452}"/>
+              </a:ext>
+            </a:extLst>
+          </p:cNvPr>
+          <p:cNvSpPr txBox="1"/>
+          <p:nvPr/>
+        </p:nvSpPr>
+        <p:spPr>
+          <a:xfrm>
+            <a:off x="9202984" y="4419865"/>
+            <a:ext cx="2954683" cy="523220"/>
+          </a:xfrm>
+          <a:prstGeom prst="rect">
+            <a:avLst/>
+          </a:prstGeom>
+          <a:noFill/>
+        </p:spPr>
+        <p:txBody>
+          <a:bodyPr wrap="square">
+            <a:spAutoFit/>
+          </a:bodyPr>
+          <a:lstStyle/>
+          <a:p>
+            <a:pPr marL="0" indent="0">
+              <a:buClr>
+                <a:srgbClr val="D45500"/>
+              </a:buClr>
+              <a:buFontTx/>
+              <a:buNone/>
+            </a:pPr>
+            <a:r>
+              <a:rPr lang="pt-PT" sz="1400" b="1" dirty="0"/>
+              <a:t>Segunda Abordagem:</a:t>
+            </a:r>
+          </a:p>
+          <a:p>
+            <a:pPr marL="285750" indent="-285750">
+              <a:buClr>
+                <a:srgbClr val="D45500"/>
+              </a:buClr>
+              <a:buFont typeface="Arial" panose="020B0604020202020204" pitchFamily="34" charset="0"/>
+              <a:buChar char="•"/>
+            </a:pPr>
+            <a:r>
+              <a:rPr lang="pt-PT" sz="1400" b="1" dirty="0"/>
+              <a:t> </a:t>
+            </a:r>
+            <a:r>
+              <a:rPr lang="pt-PT" sz="1200" b="1" dirty="0" err="1"/>
+              <a:t>Accuracy</a:t>
+            </a:r>
+            <a:r>
+              <a:rPr lang="pt-PT" sz="1200" b="1" dirty="0"/>
+              <a:t> </a:t>
+            </a:r>
+            <a:r>
+              <a:rPr lang="pt-PT" sz="1200" b="1" dirty="0" err="1"/>
+              <a:t>BiLSTM</a:t>
+            </a:r>
+            <a:r>
+              <a:rPr lang="pt-PT" sz="1400" b="1" dirty="0"/>
+              <a:t>: </a:t>
+            </a:r>
+            <a:r>
+              <a:rPr lang="pt-PT" sz="1400" dirty="0"/>
+              <a:t>99.62% </a:t>
+            </a:r>
+            <a:endParaRPr lang="pt-PT" sz="1000" dirty="0"/>
+          </a:p>
+        </p:txBody>
+      </p:sp>
+      <p:cxnSp>
+        <p:nvCxnSpPr>
+          <p:cNvPr id="31" name="Straight Connector 30">
+            <a:extLst>
+              <a:ext uri="{FF2B5EF4-FFF2-40B4-BE49-F238E27FC236}">
+                <a16:creationId xmlns:a16="http://schemas.microsoft.com/office/drawing/2014/main" id="{84D0FDB0-7AC9-1B8B-03EE-C0AC2159F893}"/>
+              </a:ext>
+            </a:extLst>
+          </p:cNvPr>
+          <p:cNvCxnSpPr/>
+          <p:nvPr/>
+        </p:nvCxnSpPr>
+        <p:spPr bwMode="auto">
+          <a:xfrm>
+            <a:off x="8900220" y="1915301"/>
+            <a:ext cx="0" cy="6922250"/>
+          </a:xfrm>
+          <a:prstGeom prst="line">
+            <a:avLst/>
+          </a:prstGeom>
+          <a:solidFill>
+            <a:schemeClr val="accent1"/>
+          </a:solidFill>
+          <a:ln w="9525" cap="flat" cmpd="sng" algn="ctr">
+            <a:solidFill>
+              <a:schemeClr val="tx1"/>
+            </a:solidFill>
+            <a:prstDash val="solid"/>
+            <a:round/>
+            <a:headEnd type="none" w="med" len="med"/>
+            <a:tailEnd type="none" w="med" len="med"/>
+          </a:ln>
+          <a:effectLst/>
+          <a:extLst>
+            <a:ext uri="{AF507438-7753-43E0-B8FC-AC1667EBCBE1}">
+              <a14:hiddenEffects xmlns:a14="http://schemas.microsoft.com/office/drawing/2010/main">
+                <a:effectLst>
+                  <a:outerShdw dist="35921" dir="2700000" algn="ctr" rotWithShape="0">
+                    <a:schemeClr val="bg2"/>
+                  </a:outerShdw>
+                </a:effectLst>
+              </a14:hiddenEffects>
+            </a:ext>
+          </a:extLst>
+        </p:spPr>
+      </p:cxnSp>
     </p:spTree>
   </p:cSld>
   <p:clrMapOvr>

</xml_diff>